<commit_message>
Updated Version of PowerPoint
EISAI POUTANA
</commit_message>
<xml_diff>
--- a/AI-OptiBuild.pptx
+++ b/AI-OptiBuild.pptx
@@ -5,7 +5,7 @@
     <p:sldMasterId id="2147483648" r:id="rId1"/>
   </p:sldMasterIdLst>
   <p:notesMasterIdLst>
-    <p:notesMasterId r:id="rId10"/>
+    <p:notesMasterId r:id="rId11"/>
   </p:notesMasterIdLst>
   <p:sldIdLst>
     <p:sldId id="256" r:id="rId2"/>
@@ -14,8 +14,9 @@
     <p:sldId id="258" r:id="rId5"/>
     <p:sldId id="259" r:id="rId6"/>
     <p:sldId id="262" r:id="rId7"/>
-    <p:sldId id="263" r:id="rId8"/>
-    <p:sldId id="260" r:id="rId9"/>
+    <p:sldId id="264" r:id="rId8"/>
+    <p:sldId id="263" r:id="rId9"/>
+    <p:sldId id="260" r:id="rId10"/>
   </p:sldIdLst>
   <p:sldSz cx="9144000" cy="6858000" type="screen4x3"/>
   <p:notesSz cx="6858000" cy="9144000"/>
@@ -145,18 +146,12 @@
 </p:cmAuthorLst>
 </file>
 
-<file path=ppt/comments/comment1.xml><?xml version="1.0" encoding="utf-8"?>
-<p:cmLst xmlns:a="http://schemas.openxmlformats.org/drawingml/2006/main" xmlns:r="http://schemas.openxmlformats.org/officeDocument/2006/relationships" xmlns:p="http://schemas.openxmlformats.org/presentationml/2006/main">
-  <p:cm authorId="1" dt="2024-05-29T22:50:28.896" idx="1">
-    <p:pos x="10" y="10"/>
-    <p:text/>
-    <p:extLst>
-      <p:ext uri="{C676402C-5697-4E1C-873F-D02D1690AC5C}">
-        <p15:threadingInfo xmlns:p15="http://schemas.microsoft.com/office/powerpoint/2012/main" timeZoneBias="-180"/>
-      </p:ext>
-    </p:extLst>
-  </p:cm>
-</p:cmLst>
+<file path=ppt/revisionInfo.xml><?xml version="1.0" encoding="utf-8"?>
+<p1510:revInfo xmlns:a="http://schemas.openxmlformats.org/drawingml/2006/main" xmlns:r="http://schemas.openxmlformats.org/officeDocument/2006/relationships" xmlns:p1510="http://schemas.microsoft.com/office/powerpoint/2015/10/main">
+  <p1510:revLst>
+    <p1510:client id="{CBD691D7-0124-40AA-AAC3-9DE1E7FA9122}" v="3" dt="2024-06-08T20:47:28.512"/>
+  </p1510:revLst>
+</p1510:revInfo>
 </file>
 
 <file path=ppt/notesMasters/notesMaster1.xml><?xml version="1.0" encoding="utf-8"?>
@@ -241,7 +236,7 @@
           <a:p>
             <a:fld id="{A242D4D1-A20E-44D7-8D4B-2BB3E66D645D}" type="datetimeFigureOut">
               <a:rPr lang="el-GR" smtClean="0"/>
-              <a:t>29/5/2024</a:t>
+              <a:t>8/6/2024</a:t>
             </a:fld>
             <a:endParaRPr lang="el-GR"/>
           </a:p>
@@ -771,7 +766,7 @@
           <a:p>
             <a:fld id="{0F412159-4C5F-4C84-A8E2-A95264118C32}" type="datetimeFigureOut">
               <a:rPr lang="en-US" smtClean="0"/>
-              <a:t>5/29/2024</a:t>
+              <a:t>6/8/2024</a:t>
             </a:fld>
             <a:endParaRPr lang="en-US" dirty="0"/>
           </a:p>
@@ -939,7 +934,7 @@
           <a:p>
             <a:fld id="{0F412159-4C5F-4C84-A8E2-A95264118C32}" type="datetimeFigureOut">
               <a:rPr lang="en-US" smtClean="0"/>
-              <a:t>5/29/2024</a:t>
+              <a:t>6/8/2024</a:t>
             </a:fld>
             <a:endParaRPr lang="en-US" dirty="0"/>
           </a:p>
@@ -1117,7 +1112,7 @@
           <a:p>
             <a:fld id="{0F412159-4C5F-4C84-A8E2-A95264118C32}" type="datetimeFigureOut">
               <a:rPr lang="en-US" smtClean="0"/>
-              <a:t>5/29/2024</a:t>
+              <a:t>6/8/2024</a:t>
             </a:fld>
             <a:endParaRPr lang="en-US" dirty="0"/>
           </a:p>
@@ -1285,7 +1280,7 @@
           <a:p>
             <a:fld id="{0F412159-4C5F-4C84-A8E2-A95264118C32}" type="datetimeFigureOut">
               <a:rPr lang="en-US" smtClean="0"/>
-              <a:t>5/29/2024</a:t>
+              <a:t>6/8/2024</a:t>
             </a:fld>
             <a:endParaRPr lang="en-US" dirty="0"/>
           </a:p>
@@ -1530,7 +1525,7 @@
           <a:p>
             <a:fld id="{0F412159-4C5F-4C84-A8E2-A95264118C32}" type="datetimeFigureOut">
               <a:rPr lang="en-US" smtClean="0"/>
-              <a:t>5/29/2024</a:t>
+              <a:t>6/8/2024</a:t>
             </a:fld>
             <a:endParaRPr lang="en-US" dirty="0"/>
           </a:p>
@@ -1815,7 +1810,7 @@
           <a:p>
             <a:fld id="{0F412159-4C5F-4C84-A8E2-A95264118C32}" type="datetimeFigureOut">
               <a:rPr lang="en-US" smtClean="0"/>
-              <a:t>5/29/2024</a:t>
+              <a:t>6/8/2024</a:t>
             </a:fld>
             <a:endParaRPr lang="en-US" dirty="0"/>
           </a:p>
@@ -2234,7 +2229,7 @@
           <a:p>
             <a:fld id="{0F412159-4C5F-4C84-A8E2-A95264118C32}" type="datetimeFigureOut">
               <a:rPr lang="en-US" smtClean="0"/>
-              <a:t>5/29/2024</a:t>
+              <a:t>6/8/2024</a:t>
             </a:fld>
             <a:endParaRPr lang="en-US" dirty="0"/>
           </a:p>
@@ -2351,7 +2346,7 @@
           <a:p>
             <a:fld id="{0F412159-4C5F-4C84-A8E2-A95264118C32}" type="datetimeFigureOut">
               <a:rPr lang="en-US" smtClean="0"/>
-              <a:t>5/29/2024</a:t>
+              <a:t>6/8/2024</a:t>
             </a:fld>
             <a:endParaRPr lang="en-US" dirty="0"/>
           </a:p>
@@ -2446,7 +2441,7 @@
           <a:p>
             <a:fld id="{0F412159-4C5F-4C84-A8E2-A95264118C32}" type="datetimeFigureOut">
               <a:rPr lang="en-US" smtClean="0"/>
-              <a:t>5/29/2024</a:t>
+              <a:t>6/8/2024</a:t>
             </a:fld>
             <a:endParaRPr lang="en-US" dirty="0"/>
           </a:p>
@@ -2721,7 +2716,7 @@
           <a:p>
             <a:fld id="{0F412159-4C5F-4C84-A8E2-A95264118C32}" type="datetimeFigureOut">
               <a:rPr lang="en-US" smtClean="0"/>
-              <a:t>5/29/2024</a:t>
+              <a:t>6/8/2024</a:t>
             </a:fld>
             <a:endParaRPr lang="en-US" dirty="0"/>
           </a:p>
@@ -2973,7 +2968,7 @@
           <a:p>
             <a:fld id="{0F412159-4C5F-4C84-A8E2-A95264118C32}" type="datetimeFigureOut">
               <a:rPr lang="en-US" smtClean="0"/>
-              <a:t>5/29/2024</a:t>
+              <a:t>6/8/2024</a:t>
             </a:fld>
             <a:endParaRPr lang="en-US" dirty="0"/>
           </a:p>
@@ -3184,7 +3179,7 @@
           <a:p>
             <a:fld id="{0F412159-4C5F-4C84-A8E2-A95264118C32}" type="datetimeFigureOut">
               <a:rPr lang="en-US" smtClean="0"/>
-              <a:t>5/29/2024</a:t>
+              <a:t>6/8/2024</a:t>
             </a:fld>
             <a:endParaRPr lang="en-US" dirty="0"/>
           </a:p>
@@ -4791,6 +4786,157 @@
           <p:cNvPr id="2" name="Τίτλος 1">
             <a:extLst>
               <a:ext uri="{FF2B5EF4-FFF2-40B4-BE49-F238E27FC236}">
+                <a16:creationId xmlns:a16="http://schemas.microsoft.com/office/drawing/2014/main" id="{6479DFE4-B06A-999C-CAB8-2F025EF24B36}"/>
+              </a:ext>
+            </a:extLst>
+          </p:cNvPr>
+          <p:cNvSpPr>
+            <a:spLocks noGrp="1"/>
+          </p:cNvSpPr>
+          <p:nvPr>
+            <p:ph type="title"/>
+          </p:nvPr>
+        </p:nvSpPr>
+        <p:spPr>
+          <a:xfrm>
+            <a:off x="381000" y="24414"/>
+            <a:ext cx="8229600" cy="1143000"/>
+          </a:xfrm>
+        </p:spPr>
+        <p:txBody>
+          <a:bodyPr/>
+          <a:lstStyle/>
+          <a:p>
+            <a:r>
+              <a:rPr lang="el-GR" dirty="0"/>
+              <a:t>Διάγραμμα Βάσης Δεδομένων</a:t>
+            </a:r>
+          </a:p>
+        </p:txBody>
+      </p:sp>
+      <p:sp>
+        <p:nvSpPr>
+          <p:cNvPr id="3" name="Θέση περιεχομένου 2">
+            <a:extLst>
+              <a:ext uri="{FF2B5EF4-FFF2-40B4-BE49-F238E27FC236}">
+                <a16:creationId xmlns:a16="http://schemas.microsoft.com/office/drawing/2014/main" id="{3985A202-F59E-A393-63AA-6BCC159044F0}"/>
+              </a:ext>
+            </a:extLst>
+          </p:cNvPr>
+          <p:cNvSpPr>
+            <a:spLocks noGrp="1"/>
+          </p:cNvSpPr>
+          <p:nvPr>
+            <p:ph idx="1"/>
+          </p:nvPr>
+        </p:nvSpPr>
+        <p:spPr>
+          <a:xfrm>
+            <a:off x="304800" y="1167414"/>
+            <a:ext cx="8382000" cy="1676400"/>
+          </a:xfrm>
+        </p:spPr>
+        <p:txBody>
+          <a:bodyPr>
+            <a:normAutofit/>
+          </a:bodyPr>
+          <a:lstStyle/>
+          <a:p>
+            <a:r>
+              <a:rPr lang="el-GR" sz="1800" dirty="0">
+                <a:solidFill>
+                  <a:srgbClr val="002060"/>
+                </a:solidFill>
+              </a:rPr>
+              <a:t>Το διάγραμμα παρουσιάζει τους πίνακες και τις σχέσεις της βάσης δεδομένων που χρησιμοποιούνται στην εφαρμογή AI-</a:t>
+            </a:r>
+            <a:r>
+              <a:rPr lang="el-GR" sz="1800" dirty="0" err="1">
+                <a:solidFill>
+                  <a:srgbClr val="002060"/>
+                </a:solidFill>
+              </a:rPr>
+              <a:t>OptiBuild</a:t>
+            </a:r>
+            <a:endParaRPr lang="el-GR" sz="1800" dirty="0">
+              <a:solidFill>
+                <a:srgbClr val="002060"/>
+              </a:solidFill>
+            </a:endParaRPr>
+          </a:p>
+        </p:txBody>
+      </p:sp>
+      <p:pic>
+        <p:nvPicPr>
+          <p:cNvPr id="5" name="Εικόνα 4">
+            <a:extLst>
+              <a:ext uri="{FF2B5EF4-FFF2-40B4-BE49-F238E27FC236}">
+                <a16:creationId xmlns:a16="http://schemas.microsoft.com/office/drawing/2014/main" id="{6A8DA4E6-FF0E-CBCD-2D93-98F8AB3C5958}"/>
+              </a:ext>
+            </a:extLst>
+          </p:cNvPr>
+          <p:cNvPicPr>
+            <a:picLocks noChangeAspect="1"/>
+          </p:cNvPicPr>
+          <p:nvPr/>
+        </p:nvPicPr>
+        <p:blipFill>
+          <a:blip r:embed="rId2">
+            <a:extLst>
+              <a:ext uri="{28A0092B-C50C-407E-A947-70E740481C1C}">
+                <a14:useLocalDpi xmlns:a14="http://schemas.microsoft.com/office/drawing/2010/main" val="0"/>
+              </a:ext>
+            </a:extLst>
+          </a:blip>
+          <a:stretch>
+            <a:fillRect/>
+          </a:stretch>
+        </p:blipFill>
+        <p:spPr>
+          <a:xfrm>
+            <a:off x="914400" y="1828799"/>
+            <a:ext cx="7086600" cy="4938239"/>
+          </a:xfrm>
+          <a:prstGeom prst="rect">
+            <a:avLst/>
+          </a:prstGeom>
+        </p:spPr>
+      </p:pic>
+    </p:spTree>
+    <p:extLst>
+      <p:ext uri="{BB962C8B-B14F-4D97-AF65-F5344CB8AC3E}">
+        <p14:creationId xmlns:p14="http://schemas.microsoft.com/office/powerpoint/2010/main" val="86917514"/>
+      </p:ext>
+    </p:extLst>
+  </p:cSld>
+  <p:clrMapOvr>
+    <a:masterClrMapping/>
+  </p:clrMapOvr>
+</p:sld>
+</file>
+
+<file path=ppt/slides/slide8.xml><?xml version="1.0" encoding="utf-8"?>
+<p:sld xmlns:a="http://schemas.openxmlformats.org/drawingml/2006/main" xmlns:r="http://schemas.openxmlformats.org/officeDocument/2006/relationships" xmlns:p="http://schemas.openxmlformats.org/presentationml/2006/main">
+  <p:cSld>
+    <p:spTree>
+      <p:nvGrpSpPr>
+        <p:cNvPr id="1" name=""/>
+        <p:cNvGrpSpPr/>
+        <p:nvPr/>
+      </p:nvGrpSpPr>
+      <p:grpSpPr>
+        <a:xfrm>
+          <a:off x="0" y="0"/>
+          <a:ext cx="0" cy="0"/>
+          <a:chOff x="0" y="0"/>
+          <a:chExt cx="0" cy="0"/>
+        </a:xfrm>
+      </p:grpSpPr>
+      <p:sp>
+        <p:nvSpPr>
+          <p:cNvPr id="2" name="Τίτλος 1">
+            <a:extLst>
+              <a:ext uri="{FF2B5EF4-FFF2-40B4-BE49-F238E27FC236}">
                 <a16:creationId xmlns:a16="http://schemas.microsoft.com/office/drawing/2014/main" id="{DF518F46-F273-5F43-5893-196EC02E07FF}"/>
               </a:ext>
             </a:extLst>
@@ -4910,7 +5056,7 @@
 </p:sld>
 </file>
 
-<file path=ppt/slides/slide8.xml><?xml version="1.0" encoding="utf-8"?>
+<file path=ppt/slides/slide9.xml><?xml version="1.0" encoding="utf-8"?>
 <p:sld xmlns:a="http://schemas.openxmlformats.org/drawingml/2006/main" xmlns:r="http://schemas.openxmlformats.org/officeDocument/2006/relationships" xmlns:p="http://schemas.openxmlformats.org/presentationml/2006/main">
   <p:cSld>
     <p:spTree>

</xml_diff>